<commit_message>
Dynamic icons on cover page
Solves #1688
</commit_message>
<xml_diff>
--- a/dev/ui/eu/pics/NSPanel - EU.pptx
+++ b/dev/ui/eu/pics/NSPanel - EU.pptx
@@ -6,8 +6,9 @@
   </p:sldMasterIdLst>
   <p:sldIdLst>
     <p:sldId id="258" r:id="rId2"/>
-    <p:sldId id="256" r:id="rId3"/>
-    <p:sldId id="257" r:id="rId4"/>
+    <p:sldId id="259" r:id="rId3"/>
+    <p:sldId id="256" r:id="rId4"/>
+    <p:sldId id="257" r:id="rId5"/>
   </p:sldIdLst>
   <p:sldSz cx="4572000" cy="3048000"/>
   <p:notesSz cx="6858000" cy="9144000"/>
@@ -106,7 +107,167 @@
       </a:defRPr>
     </a:lvl9pPr>
   </p:defaultTextStyle>
+  <p:extLst>
+    <p:ext uri="{EFAFB233-063F-42B5-8137-9DF3F51BA10A}">
+      <p15:sldGuideLst xmlns:p15="http://schemas.microsoft.com/office/powerpoint/2012/main"/>
+    </p:ext>
+  </p:extLst>
 </p:presentation>
+</file>
+
+<file path=ppt/revisionInfo.xml><?xml version="1.0" encoding="utf-8"?>
+<p1510:revInfo xmlns:a="http://schemas.openxmlformats.org/drawingml/2006/main" xmlns:r="http://schemas.openxmlformats.org/officeDocument/2006/relationships" xmlns:p1510="http://schemas.microsoft.com/office/powerpoint/2015/10/main">
+  <p1510:revLst>
+    <p1510:client id="{C3835F5B-ACBF-4DC6-BB0A-50D53BBEDC6B}" v="2" dt="2024-01-20T13:46:11.800"/>
+  </p1510:revLst>
+</p1510:revInfo>
+</file>
+
+<file path=ppt/changesInfos/changesInfo1.xml><?xml version="1.0" encoding="utf-8"?>
+<pc:chgInfo xmlns:a="http://schemas.openxmlformats.org/drawingml/2006/main" xmlns:r="http://schemas.openxmlformats.org/officeDocument/2006/relationships" xmlns:ac="http://schemas.microsoft.com/office/drawing/2013/main/command" xmlns:pc="http://schemas.microsoft.com/office/powerpoint/2013/main/command">
+  <pc:docChgLst>
+    <pc:chgData name="Edward Firmo" userId="a172d909a3b48d48" providerId="LiveId" clId="{C3835F5B-ACBF-4DC6-BB0A-50D53BBEDC6B}"/>
+    <pc:docChg chg="undo custSel addSld modSld">
+      <pc:chgData name="Edward Firmo" userId="a172d909a3b48d48" providerId="LiveId" clId="{C3835F5B-ACBF-4DC6-BB0A-50D53BBEDC6B}" dt="2024-01-20T13:46:11.800" v="79"/>
+      <pc:docMkLst>
+        <pc:docMk/>
+      </pc:docMkLst>
+      <pc:sldChg chg="modSp mod">
+        <pc:chgData name="Edward Firmo" userId="a172d909a3b48d48" providerId="LiveId" clId="{C3835F5B-ACBF-4DC6-BB0A-50D53BBEDC6B}" dt="2024-01-20T12:51:51.825" v="32" actId="207"/>
+        <pc:sldMkLst>
+          <pc:docMk/>
+          <pc:sldMk cId="481644452" sldId="257"/>
+        </pc:sldMkLst>
+        <pc:spChg chg="mod">
+          <ac:chgData name="Edward Firmo" userId="a172d909a3b48d48" providerId="LiveId" clId="{C3835F5B-ACBF-4DC6-BB0A-50D53BBEDC6B}" dt="2024-01-20T12:51:51.825" v="32" actId="207"/>
+          <ac:spMkLst>
+            <pc:docMk/>
+            <pc:sldMk cId="481644452" sldId="257"/>
+            <ac:spMk id="8" creationId="{3AA2A801-457E-87BC-3B72-3221D54F8E42}"/>
+          </ac:spMkLst>
+        </pc:spChg>
+        <pc:spChg chg="mod">
+          <ac:chgData name="Edward Firmo" userId="a172d909a3b48d48" providerId="LiveId" clId="{C3835F5B-ACBF-4DC6-BB0A-50D53BBEDC6B}" dt="2024-01-20T12:51:51.825" v="32" actId="207"/>
+          <ac:spMkLst>
+            <pc:docMk/>
+            <pc:sldMk cId="481644452" sldId="257"/>
+            <ac:spMk id="9" creationId="{24DB2494-D161-11FB-FEF7-ED748EE3D1BC}"/>
+          </ac:spMkLst>
+        </pc:spChg>
+        <pc:spChg chg="mod">
+          <ac:chgData name="Edward Firmo" userId="a172d909a3b48d48" providerId="LiveId" clId="{C3835F5B-ACBF-4DC6-BB0A-50D53BBEDC6B}" dt="2024-01-20T12:51:51.825" v="32" actId="207"/>
+          <ac:spMkLst>
+            <pc:docMk/>
+            <pc:sldMk cId="481644452" sldId="257"/>
+            <ac:spMk id="10" creationId="{1CCC58E7-7282-FD56-E454-66C5E99F52F2}"/>
+          </ac:spMkLst>
+        </pc:spChg>
+        <pc:spChg chg="mod">
+          <ac:chgData name="Edward Firmo" userId="a172d909a3b48d48" providerId="LiveId" clId="{C3835F5B-ACBF-4DC6-BB0A-50D53BBEDC6B}" dt="2024-01-20T12:51:51.825" v="32" actId="207"/>
+          <ac:spMkLst>
+            <pc:docMk/>
+            <pc:sldMk cId="481644452" sldId="257"/>
+            <ac:spMk id="11" creationId="{47405F33-FD0F-47B3-2587-54459381EDD9}"/>
+          </ac:spMkLst>
+        </pc:spChg>
+        <pc:spChg chg="mod">
+          <ac:chgData name="Edward Firmo" userId="a172d909a3b48d48" providerId="LiveId" clId="{C3835F5B-ACBF-4DC6-BB0A-50D53BBEDC6B}" dt="2024-01-20T12:51:51.825" v="32" actId="207"/>
+          <ac:spMkLst>
+            <pc:docMk/>
+            <pc:sldMk cId="481644452" sldId="257"/>
+            <ac:spMk id="12" creationId="{AAFC7E33-D819-6F1F-C512-78769358B8F7}"/>
+          </ac:spMkLst>
+        </pc:spChg>
+        <pc:spChg chg="mod">
+          <ac:chgData name="Edward Firmo" userId="a172d909a3b48d48" providerId="LiveId" clId="{C3835F5B-ACBF-4DC6-BB0A-50D53BBEDC6B}" dt="2024-01-20T12:51:51.825" v="32" actId="207"/>
+          <ac:spMkLst>
+            <pc:docMk/>
+            <pc:sldMk cId="481644452" sldId="257"/>
+            <ac:spMk id="13" creationId="{1BEB1FCC-0605-CCB8-FCC2-F243BE81FE92}"/>
+          </ac:spMkLst>
+        </pc:spChg>
+        <pc:spChg chg="mod">
+          <ac:chgData name="Edward Firmo" userId="a172d909a3b48d48" providerId="LiveId" clId="{C3835F5B-ACBF-4DC6-BB0A-50D53BBEDC6B}" dt="2024-01-20T12:51:51.825" v="32" actId="207"/>
+          <ac:spMkLst>
+            <pc:docMk/>
+            <pc:sldMk cId="481644452" sldId="257"/>
+            <ac:spMk id="14" creationId="{AD39C582-2955-B913-1E03-89D3A3C1A1C7}"/>
+          </ac:spMkLst>
+        </pc:spChg>
+        <pc:spChg chg="mod">
+          <ac:chgData name="Edward Firmo" userId="a172d909a3b48d48" providerId="LiveId" clId="{C3835F5B-ACBF-4DC6-BB0A-50D53BBEDC6B}" dt="2024-01-20T12:51:51.825" v="32" actId="207"/>
+          <ac:spMkLst>
+            <pc:docMk/>
+            <pc:sldMk cId="481644452" sldId="257"/>
+            <ac:spMk id="15" creationId="{7CF83176-637F-0E98-B9D6-2E62DA2474F1}"/>
+          </ac:spMkLst>
+        </pc:spChg>
+      </pc:sldChg>
+      <pc:sldChg chg="addSp delSp modSp mod">
+        <pc:chgData name="Edward Firmo" userId="a172d909a3b48d48" providerId="LiveId" clId="{C3835F5B-ACBF-4DC6-BB0A-50D53BBEDC6B}" dt="2024-01-20T13:46:03.552" v="77" actId="21"/>
+        <pc:sldMkLst>
+          <pc:docMk/>
+          <pc:sldMk cId="220686341" sldId="258"/>
+        </pc:sldMkLst>
+        <pc:picChg chg="add del mod">
+          <ac:chgData name="Edward Firmo" userId="a172d909a3b48d48" providerId="LiveId" clId="{C3835F5B-ACBF-4DC6-BB0A-50D53BBEDC6B}" dt="2024-01-20T13:46:03.552" v="77" actId="21"/>
+          <ac:picMkLst>
+            <pc:docMk/>
+            <pc:sldMk cId="220686341" sldId="258"/>
+            <ac:picMk id="4" creationId="{EB3B1E87-E17C-0D6D-A107-8551E689D995}"/>
+          </ac:picMkLst>
+        </pc:picChg>
+        <pc:picChg chg="add del mod">
+          <ac:chgData name="Edward Firmo" userId="a172d909a3b48d48" providerId="LiveId" clId="{C3835F5B-ACBF-4DC6-BB0A-50D53BBEDC6B}" dt="2024-01-20T13:46:03.552" v="77" actId="21"/>
+          <ac:picMkLst>
+            <pc:docMk/>
+            <pc:sldMk cId="220686341" sldId="258"/>
+            <ac:picMk id="6" creationId="{A048324D-CEAA-4B79-887F-04F2E4407F88}"/>
+          </ac:picMkLst>
+        </pc:picChg>
+        <pc:picChg chg="add del mod">
+          <ac:chgData name="Edward Firmo" userId="a172d909a3b48d48" providerId="LiveId" clId="{C3835F5B-ACBF-4DC6-BB0A-50D53BBEDC6B}" dt="2024-01-20T13:46:03.552" v="77" actId="21"/>
+          <ac:picMkLst>
+            <pc:docMk/>
+            <pc:sldMk cId="220686341" sldId="258"/>
+            <ac:picMk id="8" creationId="{3B7B90AC-37C5-0824-FC54-7361D43AE22C}"/>
+          </ac:picMkLst>
+        </pc:picChg>
+      </pc:sldChg>
+      <pc:sldChg chg="addSp modSp add">
+        <pc:chgData name="Edward Firmo" userId="a172d909a3b48d48" providerId="LiveId" clId="{C3835F5B-ACBF-4DC6-BB0A-50D53BBEDC6B}" dt="2024-01-20T13:46:11.800" v="79"/>
+        <pc:sldMkLst>
+          <pc:docMk/>
+          <pc:sldMk cId="15377754" sldId="259"/>
+        </pc:sldMkLst>
+        <pc:picChg chg="add mod">
+          <ac:chgData name="Edward Firmo" userId="a172d909a3b48d48" providerId="LiveId" clId="{C3835F5B-ACBF-4DC6-BB0A-50D53BBEDC6B}" dt="2024-01-20T13:46:11.800" v="79"/>
+          <ac:picMkLst>
+            <pc:docMk/>
+            <pc:sldMk cId="15377754" sldId="259"/>
+            <ac:picMk id="4" creationId="{EB3B1E87-E17C-0D6D-A107-8551E689D995}"/>
+          </ac:picMkLst>
+        </pc:picChg>
+        <pc:picChg chg="add mod">
+          <ac:chgData name="Edward Firmo" userId="a172d909a3b48d48" providerId="LiveId" clId="{C3835F5B-ACBF-4DC6-BB0A-50D53BBEDC6B}" dt="2024-01-20T13:46:11.800" v="79"/>
+          <ac:picMkLst>
+            <pc:docMk/>
+            <pc:sldMk cId="15377754" sldId="259"/>
+            <ac:picMk id="6" creationId="{A048324D-CEAA-4B79-887F-04F2E4407F88}"/>
+          </ac:picMkLst>
+        </pc:picChg>
+        <pc:picChg chg="add mod">
+          <ac:chgData name="Edward Firmo" userId="a172d909a3b48d48" providerId="LiveId" clId="{C3835F5B-ACBF-4DC6-BB0A-50D53BBEDC6B}" dt="2024-01-20T13:46:11.800" v="79"/>
+          <ac:picMkLst>
+            <pc:docMk/>
+            <pc:sldMk cId="15377754" sldId="259"/>
+            <ac:picMk id="8" creationId="{3B7B90AC-37C5-0824-FC54-7361D43AE22C}"/>
+          </ac:picMkLst>
+        </pc:picChg>
+      </pc:sldChg>
+    </pc:docChg>
+  </pc:docChgLst>
+</pc:chgInfo>
 </file>
 
 <file path=ppt/slideLayouts/slideLayout1.xml><?xml version="1.0" encoding="utf-8"?>
@@ -240,7 +401,7 @@
           <a:p>
             <a:fld id="{024B8AE9-66EA-4D6A-A8A7-9C9BEADD6B50}" type="datetimeFigureOut">
               <a:rPr lang="en-SE" smtClean="0"/>
-              <a:t>2023-12-16</a:t>
+              <a:t>2024-01-20</a:t>
             </a:fld>
             <a:endParaRPr lang="en-SE"/>
           </a:p>
@@ -410,7 +571,7 @@
           <a:p>
             <a:fld id="{024B8AE9-66EA-4D6A-A8A7-9C9BEADD6B50}" type="datetimeFigureOut">
               <a:rPr lang="en-SE" smtClean="0"/>
-              <a:t>2023-12-16</a:t>
+              <a:t>2024-01-20</a:t>
             </a:fld>
             <a:endParaRPr lang="en-SE"/>
           </a:p>
@@ -590,7 +751,7 @@
           <a:p>
             <a:fld id="{024B8AE9-66EA-4D6A-A8A7-9C9BEADD6B50}" type="datetimeFigureOut">
               <a:rPr lang="en-SE" smtClean="0"/>
-              <a:t>2023-12-16</a:t>
+              <a:t>2024-01-20</a:t>
             </a:fld>
             <a:endParaRPr lang="en-SE"/>
           </a:p>
@@ -760,7 +921,7 @@
           <a:p>
             <a:fld id="{024B8AE9-66EA-4D6A-A8A7-9C9BEADD6B50}" type="datetimeFigureOut">
               <a:rPr lang="en-SE" smtClean="0"/>
-              <a:t>2023-12-16</a:t>
+              <a:t>2024-01-20</a:t>
             </a:fld>
             <a:endParaRPr lang="en-SE"/>
           </a:p>
@@ -1004,7 +1165,7 @@
           <a:p>
             <a:fld id="{024B8AE9-66EA-4D6A-A8A7-9C9BEADD6B50}" type="datetimeFigureOut">
               <a:rPr lang="en-SE" smtClean="0"/>
-              <a:t>2023-12-16</a:t>
+              <a:t>2024-01-20</a:t>
             </a:fld>
             <a:endParaRPr lang="en-SE"/>
           </a:p>
@@ -1236,7 +1397,7 @@
           <a:p>
             <a:fld id="{024B8AE9-66EA-4D6A-A8A7-9C9BEADD6B50}" type="datetimeFigureOut">
               <a:rPr lang="en-SE" smtClean="0"/>
-              <a:t>2023-12-16</a:t>
+              <a:t>2024-01-20</a:t>
             </a:fld>
             <a:endParaRPr lang="en-SE"/>
           </a:p>
@@ -1603,7 +1764,7 @@
           <a:p>
             <a:fld id="{024B8AE9-66EA-4D6A-A8A7-9C9BEADD6B50}" type="datetimeFigureOut">
               <a:rPr lang="en-SE" smtClean="0"/>
-              <a:t>2023-12-16</a:t>
+              <a:t>2024-01-20</a:t>
             </a:fld>
             <a:endParaRPr lang="en-SE"/>
           </a:p>
@@ -1721,7 +1882,7 @@
           <a:p>
             <a:fld id="{024B8AE9-66EA-4D6A-A8A7-9C9BEADD6B50}" type="datetimeFigureOut">
               <a:rPr lang="en-SE" smtClean="0"/>
-              <a:t>2023-12-16</a:t>
+              <a:t>2024-01-20</a:t>
             </a:fld>
             <a:endParaRPr lang="en-SE"/>
           </a:p>
@@ -1816,7 +1977,7 @@
           <a:p>
             <a:fld id="{024B8AE9-66EA-4D6A-A8A7-9C9BEADD6B50}" type="datetimeFigureOut">
               <a:rPr lang="en-SE" smtClean="0"/>
-              <a:t>2023-12-16</a:t>
+              <a:t>2024-01-20</a:t>
             </a:fld>
             <a:endParaRPr lang="en-SE"/>
           </a:p>
@@ -2093,7 +2254,7 @@
           <a:p>
             <a:fld id="{024B8AE9-66EA-4D6A-A8A7-9C9BEADD6B50}" type="datetimeFigureOut">
               <a:rPr lang="en-SE" smtClean="0"/>
-              <a:t>2023-12-16</a:t>
+              <a:t>2024-01-20</a:t>
             </a:fld>
             <a:endParaRPr lang="en-SE"/>
           </a:p>
@@ -2350,7 +2511,7 @@
           <a:p>
             <a:fld id="{024B8AE9-66EA-4D6A-A8A7-9C9BEADD6B50}" type="datetimeFigureOut">
               <a:rPr lang="en-SE" smtClean="0"/>
-              <a:t>2023-12-16</a:t>
+              <a:t>2024-01-20</a:t>
             </a:fld>
             <a:endParaRPr lang="en-SE"/>
           </a:p>
@@ -2563,7 +2724,7 @@
           <a:p>
             <a:fld id="{024B8AE9-66EA-4D6A-A8A7-9C9BEADD6B50}" type="datetimeFigureOut">
               <a:rPr lang="en-SE" smtClean="0"/>
-              <a:t>2023-12-16</a:t>
+              <a:t>2024-01-20</a:t>
             </a:fld>
             <a:endParaRPr lang="en-SE"/>
           </a:p>
@@ -3036,6 +3197,180 @@
       </p:grpSpPr>
       <p:pic>
         <p:nvPicPr>
+          <p:cNvPr id="2" name="Picture 1" descr="A colorful smoke on a black background&#10;&#10;Description automatically generated">
+            <a:extLst>
+              <a:ext uri="{FF2B5EF4-FFF2-40B4-BE49-F238E27FC236}">
+                <a16:creationId xmlns:a16="http://schemas.microsoft.com/office/drawing/2014/main" id="{632986F5-F442-0F89-C91C-356012685765}"/>
+              </a:ext>
+            </a:extLst>
+          </p:cNvPr>
+          <p:cNvPicPr>
+            <a:picLocks noChangeAspect="1"/>
+          </p:cNvPicPr>
+          <p:nvPr/>
+        </p:nvPicPr>
+        <p:blipFill>
+          <a:blip r:embed="rId2">
+            <a:extLst>
+              <a:ext uri="{28A0092B-C50C-407E-A947-70E740481C1C}">
+                <a14:useLocalDpi xmlns:a14="http://schemas.microsoft.com/office/drawing/2010/main" val="0"/>
+              </a:ext>
+            </a:extLst>
+          </a:blip>
+          <a:stretch>
+            <a:fillRect/>
+          </a:stretch>
+        </p:blipFill>
+        <p:spPr>
+          <a:xfrm>
+            <a:off x="0" y="0"/>
+            <a:ext cx="4572000" cy="3048000"/>
+          </a:xfrm>
+          <a:prstGeom prst="rect">
+            <a:avLst/>
+          </a:prstGeom>
+        </p:spPr>
+      </p:pic>
+      <p:pic>
+        <p:nvPicPr>
+          <p:cNvPr id="4" name="Picture 3" descr="A circle with a rainbow colored circle&#10;&#10;Description automatically generated with medium confidence">
+            <a:extLst>
+              <a:ext uri="{FF2B5EF4-FFF2-40B4-BE49-F238E27FC236}">
+                <a16:creationId xmlns:a16="http://schemas.microsoft.com/office/drawing/2014/main" id="{EB3B1E87-E17C-0D6D-A107-8551E689D995}"/>
+              </a:ext>
+            </a:extLst>
+          </p:cNvPr>
+          <p:cNvPicPr>
+            <a:picLocks noChangeAspect="1"/>
+          </p:cNvPicPr>
+          <p:nvPr/>
+        </p:nvPicPr>
+        <p:blipFill>
+          <a:blip r:embed="rId3">
+            <a:extLst>
+              <a:ext uri="{28A0092B-C50C-407E-A947-70E740481C1C}">
+                <a14:useLocalDpi xmlns:a14="http://schemas.microsoft.com/office/drawing/2010/main" val="0"/>
+              </a:ext>
+            </a:extLst>
+          </a:blip>
+          <a:stretch>
+            <a:fillRect/>
+          </a:stretch>
+        </p:blipFill>
+        <p:spPr>
+          <a:xfrm>
+            <a:off x="2379366" y="752446"/>
+            <a:ext cx="1905266" cy="1905266"/>
+          </a:xfrm>
+          <a:prstGeom prst="rect">
+            <a:avLst/>
+          </a:prstGeom>
+        </p:spPr>
+      </p:pic>
+      <p:pic>
+        <p:nvPicPr>
+          <p:cNvPr id="6" name="Picture 5" descr="A yellow and white gradient&#10;&#10;Description automatically generated">
+            <a:extLst>
+              <a:ext uri="{FF2B5EF4-FFF2-40B4-BE49-F238E27FC236}">
+                <a16:creationId xmlns:a16="http://schemas.microsoft.com/office/drawing/2014/main" id="{A048324D-CEAA-4B79-887F-04F2E4407F88}"/>
+              </a:ext>
+            </a:extLst>
+          </p:cNvPr>
+          <p:cNvPicPr>
+            <a:picLocks noChangeAspect="1"/>
+          </p:cNvPicPr>
+          <p:nvPr/>
+        </p:nvPicPr>
+        <p:blipFill>
+          <a:blip r:embed="rId4">
+            <a:extLst>
+              <a:ext uri="{28A0092B-C50C-407E-A947-70E740481C1C}">
+                <a14:useLocalDpi xmlns:a14="http://schemas.microsoft.com/office/drawing/2010/main" val="0"/>
+              </a:ext>
+            </a:extLst>
+          </a:blip>
+          <a:stretch>
+            <a:fillRect/>
+          </a:stretch>
+        </p:blipFill>
+        <p:spPr>
+          <a:xfrm>
+            <a:off x="1298850" y="585892"/>
+            <a:ext cx="809625" cy="2238375"/>
+          </a:xfrm>
+          <a:prstGeom prst="rect">
+            <a:avLst/>
+          </a:prstGeom>
+        </p:spPr>
+      </p:pic>
+      <p:pic>
+        <p:nvPicPr>
+          <p:cNvPr id="8" name="Picture 7" descr="A blue and white background&#10;&#10;Description automatically generated">
+            <a:extLst>
+              <a:ext uri="{FF2B5EF4-FFF2-40B4-BE49-F238E27FC236}">
+                <a16:creationId xmlns:a16="http://schemas.microsoft.com/office/drawing/2014/main" id="{3B7B90AC-37C5-0824-FC54-7361D43AE22C}"/>
+              </a:ext>
+            </a:extLst>
+          </p:cNvPr>
+          <p:cNvPicPr>
+            <a:picLocks noChangeAspect="1"/>
+          </p:cNvPicPr>
+          <p:nvPr/>
+        </p:nvPicPr>
+        <p:blipFill>
+          <a:blip r:embed="rId5">
+            <a:extLst>
+              <a:ext uri="{28A0092B-C50C-407E-A947-70E740481C1C}">
+                <a14:useLocalDpi xmlns:a14="http://schemas.microsoft.com/office/drawing/2010/main" val="0"/>
+              </a:ext>
+            </a:extLst>
+          </a:blip>
+          <a:stretch>
+            <a:fillRect/>
+          </a:stretch>
+        </p:blipFill>
+        <p:spPr>
+          <a:xfrm>
+            <a:off x="216406" y="585892"/>
+            <a:ext cx="809738" cy="2238687"/>
+          </a:xfrm>
+          <a:prstGeom prst="rect">
+            <a:avLst/>
+          </a:prstGeom>
+        </p:spPr>
+      </p:pic>
+    </p:spTree>
+    <p:extLst>
+      <p:ext uri="{BB962C8B-B14F-4D97-AF65-F5344CB8AC3E}">
+        <p14:creationId xmlns:p14="http://schemas.microsoft.com/office/powerpoint/2010/main" val="15377754"/>
+      </p:ext>
+    </p:extLst>
+  </p:cSld>
+  <p:clrMapOvr>
+    <a:masterClrMapping/>
+  </p:clrMapOvr>
+</p:sld>
+</file>
+
+<file path=ppt/slides/slide3.xml><?xml version="1.0" encoding="utf-8"?>
+<p:sld xmlns:a="http://schemas.openxmlformats.org/drawingml/2006/main" xmlns:r="http://schemas.openxmlformats.org/officeDocument/2006/relationships" xmlns:p="http://schemas.openxmlformats.org/presentationml/2006/main">
+  <p:cSld>
+    <p:spTree>
+      <p:nvGrpSpPr>
+        <p:cNvPr id="1" name=""/>
+        <p:cNvGrpSpPr/>
+        <p:nvPr/>
+      </p:nvGrpSpPr>
+      <p:grpSpPr>
+        <a:xfrm>
+          <a:off x="0" y="0"/>
+          <a:ext cx="0" cy="0"/>
+          <a:chOff x="0" y="0"/>
+          <a:chExt cx="0" cy="0"/>
+        </a:xfrm>
+      </p:grpSpPr>
+      <p:pic>
+        <p:nvPicPr>
           <p:cNvPr id="5" name="Picture 4" descr="A colorful smoke on a black background&#10;&#10;Description automatically generated">
             <a:extLst>
               <a:ext uri="{FF2B5EF4-FFF2-40B4-BE49-F238E27FC236}">
@@ -3499,7 +3834,7 @@
 </p:sld>
 </file>
 
-<file path=ppt/slides/slide3.xml><?xml version="1.0" encoding="utf-8"?>
+<file path=ppt/slides/slide4.xml><?xml version="1.0" encoding="utf-8"?>
 <p:sld xmlns:a="http://schemas.openxmlformats.org/drawingml/2006/main" xmlns:r="http://schemas.openxmlformats.org/officeDocument/2006/relationships" xmlns:p="http://schemas.openxmlformats.org/presentationml/2006/main">
   <p:cSld>
     <p:spTree>

</xml_diff>

<commit_message>
Deprecate "Show while loading"
</commit_message>
<xml_diff>
--- a/dev/ui/eu/pics/NSPanel - EU.pptx
+++ b/dev/ui/eu/pics/NSPanel - EU.pptx
@@ -6,9 +6,10 @@
   </p:sldMasterIdLst>
   <p:sldIdLst>
     <p:sldId id="258" r:id="rId2"/>
-    <p:sldId id="259" r:id="rId3"/>
-    <p:sldId id="256" r:id="rId4"/>
-    <p:sldId id="257" r:id="rId5"/>
+    <p:sldId id="261" r:id="rId3"/>
+    <p:sldId id="259" r:id="rId4"/>
+    <p:sldId id="256" r:id="rId5"/>
+    <p:sldId id="257" r:id="rId6"/>
   </p:sldIdLst>
   <p:sldSz cx="4572000" cy="3048000"/>
   <p:notesSz cx="6858000" cy="9144000"/>
@@ -118,7 +119,7 @@
 <file path=ppt/revisionInfo.xml><?xml version="1.0" encoding="utf-8"?>
 <p1510:revInfo xmlns:a="http://schemas.openxmlformats.org/drawingml/2006/main" xmlns:r="http://schemas.openxmlformats.org/officeDocument/2006/relationships" xmlns:p1510="http://schemas.microsoft.com/office/powerpoint/2015/10/main">
   <p1510:revLst>
-    <p1510:client id="{C3835F5B-ACBF-4DC6-BB0A-50D53BBEDC6B}" v="2" dt="2024-01-20T13:46:11.800"/>
+    <p1510:client id="{C3835F5B-ACBF-4DC6-BB0A-50D53BBEDC6B}" v="3" dt="2024-02-01T09:40:19.323"/>
   </p1510:revLst>
 </p1510:revInfo>
 </file>
@@ -127,17 +128,33 @@
 <pc:chgInfo xmlns:a="http://schemas.openxmlformats.org/drawingml/2006/main" xmlns:r="http://schemas.openxmlformats.org/officeDocument/2006/relationships" xmlns:ac="http://schemas.microsoft.com/office/drawing/2013/main/command" xmlns:pc="http://schemas.microsoft.com/office/powerpoint/2013/main/command">
   <pc:docChgLst>
     <pc:chgData name="Edward Firmo" userId="a172d909a3b48d48" providerId="LiveId" clId="{C3835F5B-ACBF-4DC6-BB0A-50D53BBEDC6B}"/>
-    <pc:docChg chg="undo custSel addSld modSld">
-      <pc:chgData name="Edward Firmo" userId="a172d909a3b48d48" providerId="LiveId" clId="{C3835F5B-ACBF-4DC6-BB0A-50D53BBEDC6B}" dt="2024-01-20T13:46:11.800" v="79"/>
+    <pc:docChg chg="undo custSel addSld delSld modSld">
+      <pc:chgData name="Edward Firmo" userId="a172d909a3b48d48" providerId="LiveId" clId="{C3835F5B-ACBF-4DC6-BB0A-50D53BBEDC6B}" dt="2024-02-01T09:40:22.208" v="148" actId="47"/>
       <pc:docMkLst>
         <pc:docMk/>
       </pc:docMkLst>
-      <pc:sldChg chg="modSp mod">
-        <pc:chgData name="Edward Firmo" userId="a172d909a3b48d48" providerId="LiveId" clId="{C3835F5B-ACBF-4DC6-BB0A-50D53BBEDC6B}" dt="2024-01-20T12:51:51.825" v="32" actId="207"/>
+      <pc:sldChg chg="addSp delSp modSp mod">
+        <pc:chgData name="Edward Firmo" userId="a172d909a3b48d48" providerId="LiveId" clId="{C3835F5B-ACBF-4DC6-BB0A-50D53BBEDC6B}" dt="2024-02-01T09:40:12.424" v="145" actId="21"/>
         <pc:sldMkLst>
           <pc:docMk/>
           <pc:sldMk cId="481644452" sldId="257"/>
         </pc:sldMkLst>
+        <pc:spChg chg="add del mod">
+          <ac:chgData name="Edward Firmo" userId="a172d909a3b48d48" providerId="LiveId" clId="{C3835F5B-ACBF-4DC6-BB0A-50D53BBEDC6B}" dt="2024-02-01T09:40:12.424" v="145" actId="21"/>
+          <ac:spMkLst>
+            <pc:docMk/>
+            <pc:sldMk cId="481644452" sldId="257"/>
+            <ac:spMk id="2" creationId="{0EEB4A34-4813-8107-E073-E4629C1683CC}"/>
+          </ac:spMkLst>
+        </pc:spChg>
+        <pc:spChg chg="add del mod">
+          <ac:chgData name="Edward Firmo" userId="a172d909a3b48d48" providerId="LiveId" clId="{C3835F5B-ACBF-4DC6-BB0A-50D53BBEDC6B}" dt="2024-02-01T09:33:58.297" v="143" actId="478"/>
+          <ac:spMkLst>
+            <pc:docMk/>
+            <pc:sldMk cId="481644452" sldId="257"/>
+            <ac:spMk id="3" creationId="{98EBDE05-0AF3-BDFE-A8F3-6C2E9855ACA9}"/>
+          </ac:spMkLst>
+        </pc:spChg>
         <pc:spChg chg="mod">
           <ac:chgData name="Edward Firmo" userId="a172d909a3b48d48" providerId="LiveId" clId="{C3835F5B-ACBF-4DC6-BB0A-50D53BBEDC6B}" dt="2024-01-20T12:51:51.825" v="32" actId="207"/>
           <ac:spMkLst>
@@ -265,6 +282,28 @@
           </ac:picMkLst>
         </pc:picChg>
       </pc:sldChg>
+      <pc:sldChg chg="new del">
+        <pc:chgData name="Edward Firmo" userId="a172d909a3b48d48" providerId="LiveId" clId="{C3835F5B-ACBF-4DC6-BB0A-50D53BBEDC6B}" dt="2024-02-01T09:40:22.208" v="148" actId="47"/>
+        <pc:sldMkLst>
+          <pc:docMk/>
+          <pc:sldMk cId="1430413120" sldId="260"/>
+        </pc:sldMkLst>
+      </pc:sldChg>
+      <pc:sldChg chg="addSp modSp add">
+        <pc:chgData name="Edward Firmo" userId="a172d909a3b48d48" providerId="LiveId" clId="{C3835F5B-ACBF-4DC6-BB0A-50D53BBEDC6B}" dt="2024-02-01T09:40:19.322" v="147"/>
+        <pc:sldMkLst>
+          <pc:docMk/>
+          <pc:sldMk cId="2904208445" sldId="261"/>
+        </pc:sldMkLst>
+        <pc:spChg chg="add mod">
+          <ac:chgData name="Edward Firmo" userId="a172d909a3b48d48" providerId="LiveId" clId="{C3835F5B-ACBF-4DC6-BB0A-50D53BBEDC6B}" dt="2024-02-01T09:40:19.322" v="147"/>
+          <ac:spMkLst>
+            <pc:docMk/>
+            <pc:sldMk cId="2904208445" sldId="261"/>
+            <ac:spMk id="3" creationId="{0EEB4A34-4813-8107-E073-E4629C1683CC}"/>
+          </ac:spMkLst>
+        </pc:spChg>
+      </pc:sldChg>
     </pc:docChg>
   </pc:docChgLst>
 </pc:chgInfo>
@@ -401,7 +440,7 @@
           <a:p>
             <a:fld id="{024B8AE9-66EA-4D6A-A8A7-9C9BEADD6B50}" type="datetimeFigureOut">
               <a:rPr lang="en-SE" smtClean="0"/>
-              <a:t>2024-01-20</a:t>
+              <a:t>2024-02-01</a:t>
             </a:fld>
             <a:endParaRPr lang="en-SE"/>
           </a:p>
@@ -571,7 +610,7 @@
           <a:p>
             <a:fld id="{024B8AE9-66EA-4D6A-A8A7-9C9BEADD6B50}" type="datetimeFigureOut">
               <a:rPr lang="en-SE" smtClean="0"/>
-              <a:t>2024-01-20</a:t>
+              <a:t>2024-02-01</a:t>
             </a:fld>
             <a:endParaRPr lang="en-SE"/>
           </a:p>
@@ -751,7 +790,7 @@
           <a:p>
             <a:fld id="{024B8AE9-66EA-4D6A-A8A7-9C9BEADD6B50}" type="datetimeFigureOut">
               <a:rPr lang="en-SE" smtClean="0"/>
-              <a:t>2024-01-20</a:t>
+              <a:t>2024-02-01</a:t>
             </a:fld>
             <a:endParaRPr lang="en-SE"/>
           </a:p>
@@ -921,7 +960,7 @@
           <a:p>
             <a:fld id="{024B8AE9-66EA-4D6A-A8A7-9C9BEADD6B50}" type="datetimeFigureOut">
               <a:rPr lang="en-SE" smtClean="0"/>
-              <a:t>2024-01-20</a:t>
+              <a:t>2024-02-01</a:t>
             </a:fld>
             <a:endParaRPr lang="en-SE"/>
           </a:p>
@@ -1165,7 +1204,7 @@
           <a:p>
             <a:fld id="{024B8AE9-66EA-4D6A-A8A7-9C9BEADD6B50}" type="datetimeFigureOut">
               <a:rPr lang="en-SE" smtClean="0"/>
-              <a:t>2024-01-20</a:t>
+              <a:t>2024-02-01</a:t>
             </a:fld>
             <a:endParaRPr lang="en-SE"/>
           </a:p>
@@ -1397,7 +1436,7 @@
           <a:p>
             <a:fld id="{024B8AE9-66EA-4D6A-A8A7-9C9BEADD6B50}" type="datetimeFigureOut">
               <a:rPr lang="en-SE" smtClean="0"/>
-              <a:t>2024-01-20</a:t>
+              <a:t>2024-02-01</a:t>
             </a:fld>
             <a:endParaRPr lang="en-SE"/>
           </a:p>
@@ -1764,7 +1803,7 @@
           <a:p>
             <a:fld id="{024B8AE9-66EA-4D6A-A8A7-9C9BEADD6B50}" type="datetimeFigureOut">
               <a:rPr lang="en-SE" smtClean="0"/>
-              <a:t>2024-01-20</a:t>
+              <a:t>2024-02-01</a:t>
             </a:fld>
             <a:endParaRPr lang="en-SE"/>
           </a:p>
@@ -1882,7 +1921,7 @@
           <a:p>
             <a:fld id="{024B8AE9-66EA-4D6A-A8A7-9C9BEADD6B50}" type="datetimeFigureOut">
               <a:rPr lang="en-SE" smtClean="0"/>
-              <a:t>2024-01-20</a:t>
+              <a:t>2024-02-01</a:t>
             </a:fld>
             <a:endParaRPr lang="en-SE"/>
           </a:p>
@@ -1977,7 +2016,7 @@
           <a:p>
             <a:fld id="{024B8AE9-66EA-4D6A-A8A7-9C9BEADD6B50}" type="datetimeFigureOut">
               <a:rPr lang="en-SE" smtClean="0"/>
-              <a:t>2024-01-20</a:t>
+              <a:t>2024-02-01</a:t>
             </a:fld>
             <a:endParaRPr lang="en-SE"/>
           </a:p>
@@ -2254,7 +2293,7 @@
           <a:p>
             <a:fld id="{024B8AE9-66EA-4D6A-A8A7-9C9BEADD6B50}" type="datetimeFigureOut">
               <a:rPr lang="en-SE" smtClean="0"/>
-              <a:t>2024-01-20</a:t>
+              <a:t>2024-02-01</a:t>
             </a:fld>
             <a:endParaRPr lang="en-SE"/>
           </a:p>
@@ -2511,7 +2550,7 @@
           <a:p>
             <a:fld id="{024B8AE9-66EA-4D6A-A8A7-9C9BEADD6B50}" type="datetimeFigureOut">
               <a:rPr lang="en-SE" smtClean="0"/>
-              <a:t>2024-01-20</a:t>
+              <a:t>2024-02-01</a:t>
             </a:fld>
             <a:endParaRPr lang="en-SE"/>
           </a:p>
@@ -2724,7 +2763,7 @@
           <a:p>
             <a:fld id="{024B8AE9-66EA-4D6A-A8A7-9C9BEADD6B50}" type="datetimeFigureOut">
               <a:rPr lang="en-SE" smtClean="0"/>
-              <a:t>2024-01-20</a:t>
+              <a:t>2024-02-01</a:t>
             </a:fld>
             <a:endParaRPr lang="en-SE"/>
           </a:p>
@@ -3231,6 +3270,126 @@
           </a:prstGeom>
         </p:spPr>
       </p:pic>
+      <p:sp>
+        <p:nvSpPr>
+          <p:cNvPr id="3" name="Rectangle 2">
+            <a:extLst>
+              <a:ext uri="{FF2B5EF4-FFF2-40B4-BE49-F238E27FC236}">
+                <a16:creationId xmlns:a16="http://schemas.microsoft.com/office/drawing/2014/main" id="{0EEB4A34-4813-8107-E073-E4629C1683CC}"/>
+              </a:ext>
+            </a:extLst>
+          </p:cNvPr>
+          <p:cNvSpPr/>
+          <p:nvPr/>
+        </p:nvSpPr>
+        <p:spPr>
+          <a:xfrm>
+            <a:off x="4286250" y="0"/>
+            <a:ext cx="285750" cy="3048000"/>
+          </a:xfrm>
+          <a:prstGeom prst="rect">
+            <a:avLst/>
+          </a:prstGeom>
+          <a:solidFill>
+            <a:srgbClr val="FF0000">
+              <a:alpha val="25000"/>
+            </a:srgbClr>
+          </a:solidFill>
+          <a:ln>
+            <a:noFill/>
+          </a:ln>
+        </p:spPr>
+        <p:style>
+          <a:lnRef idx="2">
+            <a:schemeClr val="accent1">
+              <a:shade val="15000"/>
+            </a:schemeClr>
+          </a:lnRef>
+          <a:fillRef idx="1">
+            <a:schemeClr val="accent1"/>
+          </a:fillRef>
+          <a:effectRef idx="0">
+            <a:schemeClr val="accent1"/>
+          </a:effectRef>
+          <a:fontRef idx="minor">
+            <a:schemeClr val="lt1"/>
+          </a:fontRef>
+        </p:style>
+        <p:txBody>
+          <a:bodyPr vert="vert270" lIns="0" tIns="0" rIns="0" bIns="0" rtlCol="0" anchor="ctr"/>
+          <a:lstStyle/>
+          <a:p>
+            <a:pPr algn="ctr"/>
+            <a:endParaRPr lang="en-SE" dirty="0"/>
+          </a:p>
+        </p:txBody>
+      </p:sp>
+    </p:spTree>
+    <p:extLst>
+      <p:ext uri="{BB962C8B-B14F-4D97-AF65-F5344CB8AC3E}">
+        <p14:creationId xmlns:p14="http://schemas.microsoft.com/office/powerpoint/2010/main" val="2904208445"/>
+      </p:ext>
+    </p:extLst>
+  </p:cSld>
+  <p:clrMapOvr>
+    <a:masterClrMapping/>
+  </p:clrMapOvr>
+</p:sld>
+</file>
+
+<file path=ppt/slides/slide3.xml><?xml version="1.0" encoding="utf-8"?>
+<p:sld xmlns:a="http://schemas.openxmlformats.org/drawingml/2006/main" xmlns:r="http://schemas.openxmlformats.org/officeDocument/2006/relationships" xmlns:p="http://schemas.openxmlformats.org/presentationml/2006/main">
+  <p:cSld>
+    <p:spTree>
+      <p:nvGrpSpPr>
+        <p:cNvPr id="1" name=""/>
+        <p:cNvGrpSpPr/>
+        <p:nvPr/>
+      </p:nvGrpSpPr>
+      <p:grpSpPr>
+        <a:xfrm>
+          <a:off x="0" y="0"/>
+          <a:ext cx="0" cy="0"/>
+          <a:chOff x="0" y="0"/>
+          <a:chExt cx="0" cy="0"/>
+        </a:xfrm>
+      </p:grpSpPr>
+      <p:pic>
+        <p:nvPicPr>
+          <p:cNvPr id="2" name="Picture 1" descr="A colorful smoke on a black background&#10;&#10;Description automatically generated">
+            <a:extLst>
+              <a:ext uri="{FF2B5EF4-FFF2-40B4-BE49-F238E27FC236}">
+                <a16:creationId xmlns:a16="http://schemas.microsoft.com/office/drawing/2014/main" id="{632986F5-F442-0F89-C91C-356012685765}"/>
+              </a:ext>
+            </a:extLst>
+          </p:cNvPr>
+          <p:cNvPicPr>
+            <a:picLocks noChangeAspect="1"/>
+          </p:cNvPicPr>
+          <p:nvPr/>
+        </p:nvPicPr>
+        <p:blipFill>
+          <a:blip r:embed="rId2">
+            <a:extLst>
+              <a:ext uri="{28A0092B-C50C-407E-A947-70E740481C1C}">
+                <a14:useLocalDpi xmlns:a14="http://schemas.microsoft.com/office/drawing/2010/main" val="0"/>
+              </a:ext>
+            </a:extLst>
+          </a:blip>
+          <a:stretch>
+            <a:fillRect/>
+          </a:stretch>
+        </p:blipFill>
+        <p:spPr>
+          <a:xfrm>
+            <a:off x="0" y="0"/>
+            <a:ext cx="4572000" cy="3048000"/>
+          </a:xfrm>
+          <a:prstGeom prst="rect">
+            <a:avLst/>
+          </a:prstGeom>
+        </p:spPr>
+      </p:pic>
       <p:pic>
         <p:nvPicPr>
           <p:cNvPr id="4" name="Picture 3" descr="A circle with a rainbow colored circle&#10;&#10;Description automatically generated with medium confidence">
@@ -3352,7 +3511,7 @@
 </p:sld>
 </file>
 
-<file path=ppt/slides/slide3.xml><?xml version="1.0" encoding="utf-8"?>
+<file path=ppt/slides/slide4.xml><?xml version="1.0" encoding="utf-8"?>
 <p:sld xmlns:a="http://schemas.openxmlformats.org/drawingml/2006/main" xmlns:r="http://schemas.openxmlformats.org/officeDocument/2006/relationships" xmlns:p="http://schemas.openxmlformats.org/presentationml/2006/main">
   <p:cSld>
     <p:spTree>
@@ -3834,7 +3993,7 @@
 </p:sld>
 </file>
 
-<file path=ppt/slides/slide4.xml><?xml version="1.0" encoding="utf-8"?>
+<file path=ppt/slides/slide5.xml><?xml version="1.0" encoding="utf-8"?>
 <p:sld xmlns:a="http://schemas.openxmlformats.org/drawingml/2006/main" xmlns:r="http://schemas.openxmlformats.org/officeDocument/2006/relationships" xmlns:p="http://schemas.openxmlformats.org/presentationml/2006/main">
   <p:cSld>
     <p:spTree>

</xml_diff>